<commit_message>
Update CSD460 CAPSTONE PRESENTATION.pptx
</commit_message>
<xml_diff>
--- a/CSD460 CAPSTONE PRESENTATION.pptx
+++ b/CSD460 CAPSTONE PRESENTATION.pptx
@@ -19,7 +19,7 @@
     <p:sldId id="268" r:id="rId13"/>
     <p:sldId id="269" r:id="rId14"/>
     <p:sldId id="270" r:id="rId15"/>
-    <p:sldId id="271" r:id="rId16"/>
+    <p:sldId id="272" r:id="rId16"/>
     <p:sldId id="264" r:id="rId17"/>
   </p:sldIdLst>
   <p:sldSz cx="12192000" cy="6858000"/>
@@ -1071,7 +1071,11 @@
         <a:p>
           <a:r>
             <a:rPr lang="en-US"/>
-            <a:t>Have a meeting early, not just using a message board.</a:t>
+            <a:t>Meet early; </a:t>
+          </a:r>
+          <a:r>
+            <a:rPr lang="en-US" dirty="0"/>
+            <a:t>do not just use a message board.</a:t>
           </a:r>
         </a:p>
       </dgm:t>
@@ -1806,7 +1810,11 @@
           </a:pPr>
           <a:r>
             <a:rPr lang="en-US" sz="1900" kern="1200"/>
-            <a:t>Have a meeting early, not just using a message board.</a:t>
+            <a:t>Meet early; </a:t>
+          </a:r>
+          <a:r>
+            <a:rPr lang="en-US" sz="1900" kern="1200" dirty="0"/>
+            <a:t>do not just use a message board.</a:t>
           </a:r>
         </a:p>
       </dsp:txBody>
@@ -4022,7 +4030,7 @@
           <a:p>
             <a:fld id="{3F6C141F-735A-4819-ABAA-5835E79837FA}" type="datetimeFigureOut">
               <a:rPr lang="en-US" smtClean="0"/>
-              <a:t>12/7/2023</a:t>
+              <a:t>12/8/2023</a:t>
             </a:fld>
             <a:endParaRPr lang="en-US"/>
           </a:p>
@@ -4220,7 +4228,7 @@
           <a:p>
             <a:fld id="{3F6C141F-735A-4819-ABAA-5835E79837FA}" type="datetimeFigureOut">
               <a:rPr lang="en-US" smtClean="0"/>
-              <a:t>12/7/2023</a:t>
+              <a:t>12/8/2023</a:t>
             </a:fld>
             <a:endParaRPr lang="en-US"/>
           </a:p>
@@ -4428,7 +4436,7 @@
           <a:p>
             <a:fld id="{3F6C141F-735A-4819-ABAA-5835E79837FA}" type="datetimeFigureOut">
               <a:rPr lang="en-US" smtClean="0"/>
-              <a:t>12/7/2023</a:t>
+              <a:t>12/8/2023</a:t>
             </a:fld>
             <a:endParaRPr lang="en-US"/>
           </a:p>
@@ -4626,7 +4634,7 @@
           <a:p>
             <a:fld id="{3F6C141F-735A-4819-ABAA-5835E79837FA}" type="datetimeFigureOut">
               <a:rPr lang="en-US" smtClean="0"/>
-              <a:t>12/7/2023</a:t>
+              <a:t>12/8/2023</a:t>
             </a:fld>
             <a:endParaRPr lang="en-US"/>
           </a:p>
@@ -4901,7 +4909,7 @@
           <a:p>
             <a:fld id="{3F6C141F-735A-4819-ABAA-5835E79837FA}" type="datetimeFigureOut">
               <a:rPr lang="en-US" smtClean="0"/>
-              <a:t>12/7/2023</a:t>
+              <a:t>12/8/2023</a:t>
             </a:fld>
             <a:endParaRPr lang="en-US"/>
           </a:p>
@@ -5166,7 +5174,7 @@
           <a:p>
             <a:fld id="{3F6C141F-735A-4819-ABAA-5835E79837FA}" type="datetimeFigureOut">
               <a:rPr lang="en-US" smtClean="0"/>
-              <a:t>12/7/2023</a:t>
+              <a:t>12/8/2023</a:t>
             </a:fld>
             <a:endParaRPr lang="en-US"/>
           </a:p>
@@ -5578,7 +5586,7 @@
           <a:p>
             <a:fld id="{3F6C141F-735A-4819-ABAA-5835E79837FA}" type="datetimeFigureOut">
               <a:rPr lang="en-US" smtClean="0"/>
-              <a:t>12/7/2023</a:t>
+              <a:t>12/8/2023</a:t>
             </a:fld>
             <a:endParaRPr lang="en-US"/>
           </a:p>
@@ -5719,7 +5727,7 @@
           <a:p>
             <a:fld id="{3F6C141F-735A-4819-ABAA-5835E79837FA}" type="datetimeFigureOut">
               <a:rPr lang="en-US" smtClean="0"/>
-              <a:t>12/7/2023</a:t>
+              <a:t>12/8/2023</a:t>
             </a:fld>
             <a:endParaRPr lang="en-US"/>
           </a:p>
@@ -5832,7 +5840,7 @@
           <a:p>
             <a:fld id="{3F6C141F-735A-4819-ABAA-5835E79837FA}" type="datetimeFigureOut">
               <a:rPr lang="en-US" smtClean="0"/>
-              <a:t>12/7/2023</a:t>
+              <a:t>12/8/2023</a:t>
             </a:fld>
             <a:endParaRPr lang="en-US"/>
           </a:p>
@@ -6143,7 +6151,7 @@
           <a:p>
             <a:fld id="{3F6C141F-735A-4819-ABAA-5835E79837FA}" type="datetimeFigureOut">
               <a:rPr lang="en-US" smtClean="0"/>
-              <a:t>12/7/2023</a:t>
+              <a:t>12/8/2023</a:t>
             </a:fld>
             <a:endParaRPr lang="en-US"/>
           </a:p>
@@ -6431,7 +6439,7 @@
           <a:p>
             <a:fld id="{3F6C141F-735A-4819-ABAA-5835E79837FA}" type="datetimeFigureOut">
               <a:rPr lang="en-US" smtClean="0"/>
-              <a:t>12/7/2023</a:t>
+              <a:t>12/8/2023</a:t>
             </a:fld>
             <a:endParaRPr lang="en-US"/>
           </a:p>
@@ -6672,7 +6680,7 @@
           <a:p>
             <a:fld id="{3F6C141F-735A-4819-ABAA-5835E79837FA}" type="datetimeFigureOut">
               <a:rPr lang="en-US" smtClean="0"/>
-              <a:t>12/7/2023</a:t>
+              <a:t>12/8/2023</a:t>
             </a:fld>
             <a:endParaRPr lang="en-US"/>
           </a:p>
@@ -8264,7 +8272,16 @@
           </a:bodyPr>
           <a:lstStyle/>
           <a:p>
-            <a:endParaRPr lang="en-US" sz="2000"/>
+            <a:r>
+              <a:rPr lang="en-US" sz="2000" dirty="0"/>
+              <a:t>This test was to see if the link to an external site was able to open a new tab and direct that tab to the site.</a:t>
+            </a:r>
+          </a:p>
+          <a:p>
+            <a:r>
+              <a:rPr lang="en-US" sz="2000" dirty="0"/>
+              <a:t>Result Pass</a:t>
+            </a:r>
           </a:p>
         </p:txBody>
       </p:sp>
@@ -8925,7 +8942,16 @@
           </a:bodyPr>
           <a:lstStyle/>
           <a:p>
-            <a:endParaRPr lang="en-US" sz="1700"/>
+            <a:r>
+              <a:rPr lang="en-US" sz="1700" dirty="0"/>
+              <a:t>Simple test to validate if the links would take the user from the home page to the reservations page using the link below the header.</a:t>
+            </a:r>
+          </a:p>
+          <a:p>
+            <a:r>
+              <a:rPr lang="en-US" sz="1700" dirty="0"/>
+              <a:t>Result: Pass</a:t>
+            </a:r>
           </a:p>
         </p:txBody>
       </p:sp>
@@ -9616,7 +9642,22 @@
           </a:bodyPr>
           <a:lstStyle/>
           <a:p>
-            <a:endParaRPr lang="en-US" sz="1700"/>
+            <a:r>
+              <a:rPr lang="en-US" sz="1700" dirty="0"/>
+              <a:t>Check to see how responsive the page was to zoom.</a:t>
+            </a:r>
+          </a:p>
+          <a:p>
+            <a:r>
+              <a:rPr lang="en-US" sz="1700" dirty="0"/>
+              <a:t>Responsive zoom did not function as intended.</a:t>
+            </a:r>
+          </a:p>
+          <a:p>
+            <a:r>
+              <a:rPr lang="en-US" sz="1700" dirty="0"/>
+              <a:t>Result: Fail</a:t>
+            </a:r>
           </a:p>
         </p:txBody>
       </p:sp>
@@ -10077,7 +10118,22 @@
           </a:bodyPr>
           <a:lstStyle/>
           <a:p>
-            <a:endParaRPr lang="en-US" sz="1700"/>
+            <a:r>
+              <a:rPr lang="en-US" sz="1700" dirty="0"/>
+              <a:t>Validate the price of rooms on the reservation page using dropdowns.</a:t>
+            </a:r>
+          </a:p>
+          <a:p>
+            <a:r>
+              <a:rPr lang="en-US" sz="1700" dirty="0"/>
+              <a:t>Prices did change as intended but were incorrect in the database.</a:t>
+            </a:r>
+          </a:p>
+          <a:p>
+            <a:r>
+              <a:rPr lang="en-US" sz="1700" dirty="0"/>
+              <a:t>Result: Fail – Due to incorrect prices being displayed </a:t>
+            </a:r>
           </a:p>
         </p:txBody>
       </p:sp>
@@ -10097,6 +10153,14 @@
 <file path=ppt/slides/slide15.xml><?xml version="1.0" encoding="utf-8"?>
 <p:sld xmlns:a="http://schemas.openxmlformats.org/drawingml/2006/main" xmlns:r="http://schemas.openxmlformats.org/officeDocument/2006/relationships" xmlns:p="http://schemas.openxmlformats.org/presentationml/2006/main">
   <p:cSld>
+    <p:bg>
+      <p:bgPr>
+        <a:solidFill>
+          <a:schemeClr val="bg1"/>
+        </a:solidFill>
+        <a:effectLst/>
+      </p:bgPr>
+    </p:bg>
     <p:spTree>
       <p:nvGrpSpPr>
         <p:cNvPr id="1" name=""/>
@@ -10111,6 +10175,401 @@
           <a:chExt cx="0" cy="0"/>
         </a:xfrm>
       </p:grpSpPr>
+      <p:sp useBgFill="1">
+        <p:nvSpPr>
+          <p:cNvPr id="13" name="Rectangle 12">
+            <a:extLst>
+              <a:ext uri="{FF2B5EF4-FFF2-40B4-BE49-F238E27FC236}">
+                <a16:creationId xmlns:a16="http://schemas.microsoft.com/office/drawing/2014/main" id="{0288C6B4-AFC3-407F-A595-EFFD38D4CCAF}"/>
+              </a:ext>
+              <a:ext uri="{C183D7F6-B498-43B3-948B-1728B52AA6E4}">
+                <adec:decorative xmlns:adec="http://schemas.microsoft.com/office/drawing/2017/decorative" val="1"/>
+              </a:ext>
+            </a:extLst>
+          </p:cNvPr>
+          <p:cNvSpPr>
+            <a:spLocks noGrp="1" noRot="1" noChangeAspect="1" noMove="1" noResize="1" noEditPoints="1" noAdjustHandles="1" noChangeArrowheads="1" noChangeShapeType="1" noTextEdit="1"/>
+          </p:cNvSpPr>
+          <p:nvPr>
+            <p:extLst>
+              <p:ext uri="{386F3935-93C4-4BCD-93E2-E3B085C9AB24}">
+                <p16:designElem xmlns:p16="http://schemas.microsoft.com/office/powerpoint/2015/main" val="1"/>
+              </p:ext>
+            </p:extLst>
+          </p:nvPr>
+        </p:nvSpPr>
+        <p:spPr>
+          <a:xfrm>
+            <a:off x="0" y="0"/>
+            <a:ext cx="12192000" cy="6858000"/>
+          </a:xfrm>
+          <a:prstGeom prst="rect">
+            <a:avLst/>
+          </a:prstGeom>
+          <a:ln>
+            <a:noFill/>
+          </a:ln>
+        </p:spPr>
+        <p:style>
+          <a:lnRef idx="2">
+            <a:schemeClr val="accent1">
+              <a:shade val="50000"/>
+            </a:schemeClr>
+          </a:lnRef>
+          <a:fillRef idx="1">
+            <a:schemeClr val="accent1"/>
+          </a:fillRef>
+          <a:effectRef idx="0">
+            <a:schemeClr val="accent1"/>
+          </a:effectRef>
+          <a:fontRef idx="minor">
+            <a:schemeClr val="lt1"/>
+          </a:fontRef>
+        </p:style>
+        <p:txBody>
+          <a:bodyPr rtlCol="0" anchor="ctr"/>
+          <a:lstStyle/>
+          <a:p>
+            <a:pPr algn="ctr"/>
+            <a:endParaRPr lang="en-US"/>
+          </a:p>
+        </p:txBody>
+      </p:sp>
+      <p:sp useBgFill="1">
+        <p:nvSpPr>
+          <p:cNvPr id="15" name="Freeform: Shape 14">
+            <a:extLst>
+              <a:ext uri="{FF2B5EF4-FFF2-40B4-BE49-F238E27FC236}">
+                <a16:creationId xmlns:a16="http://schemas.microsoft.com/office/drawing/2014/main" id="{CF236821-17FE-429B-8D2C-08E13A64EA40}"/>
+              </a:ext>
+              <a:ext uri="{C183D7F6-B498-43B3-948B-1728B52AA6E4}">
+                <adec:decorative xmlns:adec="http://schemas.microsoft.com/office/drawing/2017/decorative" val="1"/>
+              </a:ext>
+            </a:extLst>
+          </p:cNvPr>
+          <p:cNvSpPr>
+            <a:spLocks noGrp="1" noRot="1" noChangeAspect="1" noMove="1" noResize="1" noEditPoints="1" noAdjustHandles="1" noChangeArrowheads="1" noChangeShapeType="1" noTextEdit="1"/>
+          </p:cNvSpPr>
+          <p:nvPr>
+            <p:extLst>
+              <p:ext uri="{386F3935-93C4-4BCD-93E2-E3B085C9AB24}">
+                <p16:designElem xmlns:p16="http://schemas.microsoft.com/office/powerpoint/2015/main" val="1"/>
+              </p:ext>
+            </p:extLst>
+          </p:nvPr>
+        </p:nvSpPr>
+        <p:spPr>
+          <a:xfrm>
+            <a:off x="-1" y="0"/>
+            <a:ext cx="4455673" cy="6858000"/>
+          </a:xfrm>
+          <a:custGeom>
+            <a:avLst/>
+            <a:gdLst>
+              <a:gd name="connsiteX0" fmla="*/ 0 w 4455673"/>
+              <a:gd name="connsiteY0" fmla="*/ 0 h 6858000"/>
+              <a:gd name="connsiteX1" fmla="*/ 3242695 w 4455673"/>
+              <a:gd name="connsiteY1" fmla="*/ 0 h 6858000"/>
+              <a:gd name="connsiteX2" fmla="*/ 3305678 w 4455673"/>
+              <a:gd name="connsiteY2" fmla="*/ 69271 h 6858000"/>
+              <a:gd name="connsiteX3" fmla="*/ 4455673 w 4455673"/>
+              <a:gd name="connsiteY3" fmla="*/ 3429000 h 6858000"/>
+              <a:gd name="connsiteX4" fmla="*/ 3305678 w 4455673"/>
+              <a:gd name="connsiteY4" fmla="*/ 6788730 h 6858000"/>
+              <a:gd name="connsiteX5" fmla="*/ 3242695 w 4455673"/>
+              <a:gd name="connsiteY5" fmla="*/ 6858000 h 6858000"/>
+              <a:gd name="connsiteX6" fmla="*/ 0 w 4455673"/>
+              <a:gd name="connsiteY6" fmla="*/ 6858000 h 6858000"/>
+            </a:gdLst>
+            <a:ahLst/>
+            <a:cxnLst>
+              <a:cxn ang="0">
+                <a:pos x="connsiteX0" y="connsiteY0"/>
+              </a:cxn>
+              <a:cxn ang="0">
+                <a:pos x="connsiteX1" y="connsiteY1"/>
+              </a:cxn>
+              <a:cxn ang="0">
+                <a:pos x="connsiteX2" y="connsiteY2"/>
+              </a:cxn>
+              <a:cxn ang="0">
+                <a:pos x="connsiteX3" y="connsiteY3"/>
+              </a:cxn>
+              <a:cxn ang="0">
+                <a:pos x="connsiteX4" y="connsiteY4"/>
+              </a:cxn>
+              <a:cxn ang="0">
+                <a:pos x="connsiteX5" y="connsiteY5"/>
+              </a:cxn>
+              <a:cxn ang="0">
+                <a:pos x="connsiteX6" y="connsiteY6"/>
+              </a:cxn>
+            </a:cxnLst>
+            <a:rect l="l" t="t" r="r" b="b"/>
+            <a:pathLst>
+              <a:path w="4455673" h="6858000">
+                <a:moveTo>
+                  <a:pt x="0" y="0"/>
+                </a:moveTo>
+                <a:lnTo>
+                  <a:pt x="3242695" y="0"/>
+                </a:lnTo>
+                <a:lnTo>
+                  <a:pt x="3305678" y="69271"/>
+                </a:lnTo>
+                <a:cubicBezTo>
+                  <a:pt x="4016204" y="929100"/>
+                  <a:pt x="4455673" y="2116944"/>
+                  <a:pt x="4455673" y="3429000"/>
+                </a:cubicBezTo>
+                <a:cubicBezTo>
+                  <a:pt x="4455673" y="4741056"/>
+                  <a:pt x="4016204" y="5928900"/>
+                  <a:pt x="3305678" y="6788730"/>
+                </a:cubicBezTo>
+                <a:lnTo>
+                  <a:pt x="3242695" y="6858000"/>
+                </a:lnTo>
+                <a:lnTo>
+                  <a:pt x="0" y="6858000"/>
+                </a:lnTo>
+                <a:close/>
+              </a:path>
+            </a:pathLst>
+          </a:custGeom>
+          <a:ln w="9525">
+            <a:solidFill>
+              <a:srgbClr val="EFEFEF"/>
+            </a:solidFill>
+          </a:ln>
+          <a:effectLst>
+            <a:outerShdw blurRad="88900" dist="38100" algn="l" rotWithShape="0">
+              <a:schemeClr val="bg1">
+                <a:lumMod val="85000"/>
+                <a:alpha val="50000"/>
+              </a:schemeClr>
+            </a:outerShdw>
+          </a:effectLst>
+        </p:spPr>
+        <p:style>
+          <a:lnRef idx="2">
+            <a:schemeClr val="accent1">
+              <a:shade val="50000"/>
+            </a:schemeClr>
+          </a:lnRef>
+          <a:fillRef idx="1">
+            <a:schemeClr val="accent1"/>
+          </a:fillRef>
+          <a:effectRef idx="0">
+            <a:schemeClr val="accent1"/>
+          </a:effectRef>
+          <a:fontRef idx="minor">
+            <a:schemeClr val="lt1"/>
+          </a:fontRef>
+        </p:style>
+        <p:txBody>
+          <a:bodyPr wrap="square" rtlCol="0" anchor="ctr">
+            <a:noAutofit/>
+          </a:bodyPr>
+          <a:lstStyle/>
+          <a:p>
+            <a:pPr marL="0" marR="0" lvl="0" indent="0" algn="ctr" defTabSz="914400" rtl="0" eaLnBrk="1" fontAlgn="auto" latinLnBrk="0" hangingPunct="1">
+              <a:lnSpc>
+                <a:spcPct val="100000"/>
+              </a:lnSpc>
+              <a:spcBef>
+                <a:spcPts val="0"/>
+              </a:spcBef>
+              <a:spcAft>
+                <a:spcPts val="0"/>
+              </a:spcAft>
+              <a:buClrTx/>
+              <a:buSzTx/>
+              <a:buFontTx/>
+              <a:buNone/>
+              <a:tabLst/>
+              <a:defRPr/>
+            </a:pPr>
+            <a:endParaRPr kumimoji="0" lang="en-US" sz="1800" b="0" i="0" u="none" strike="noStrike" kern="1200" cap="none" spc="0" normalizeH="0" baseline="0" noProof="0">
+              <a:ln>
+                <a:noFill/>
+              </a:ln>
+              <a:solidFill>
+                <a:prstClr val="white"/>
+              </a:solidFill>
+              <a:effectLst/>
+              <a:uLnTx/>
+              <a:uFillTx/>
+              <a:latin typeface="Calibri" panose="020F0502020204030204"/>
+              <a:ea typeface="+mn-ea"/>
+              <a:cs typeface="+mn-cs"/>
+            </a:endParaRPr>
+          </a:p>
+        </p:txBody>
+      </p:sp>
+      <p:sp useBgFill="1">
+        <p:nvSpPr>
+          <p:cNvPr id="17" name="Freeform: Shape 16">
+            <a:extLst>
+              <a:ext uri="{FF2B5EF4-FFF2-40B4-BE49-F238E27FC236}">
+                <a16:creationId xmlns:a16="http://schemas.microsoft.com/office/drawing/2014/main" id="{C0BDBCD2-E081-43AB-9119-C55465E59757}"/>
+              </a:ext>
+              <a:ext uri="{C183D7F6-B498-43B3-948B-1728B52AA6E4}">
+                <adec:decorative xmlns:adec="http://schemas.microsoft.com/office/drawing/2017/decorative" val="1"/>
+              </a:ext>
+            </a:extLst>
+          </p:cNvPr>
+          <p:cNvSpPr>
+            <a:spLocks noGrp="1" noRot="1" noChangeAspect="1" noMove="1" noResize="1" noEditPoints="1" noAdjustHandles="1" noChangeArrowheads="1" noChangeShapeType="1" noTextEdit="1"/>
+          </p:cNvSpPr>
+          <p:nvPr>
+            <p:extLst>
+              <p:ext uri="{386F3935-93C4-4BCD-93E2-E3B085C9AB24}">
+                <p16:designElem xmlns:p16="http://schemas.microsoft.com/office/powerpoint/2015/main" val="1"/>
+              </p:ext>
+            </p:extLst>
+          </p:nvPr>
+        </p:nvSpPr>
+        <p:spPr>
+          <a:xfrm>
+            <a:off x="0" y="0"/>
+            <a:ext cx="4446529" cy="6858000"/>
+          </a:xfrm>
+          <a:custGeom>
+            <a:avLst/>
+            <a:gdLst>
+              <a:gd name="connsiteX0" fmla="*/ 0 w 4446529"/>
+              <a:gd name="connsiteY0" fmla="*/ 0 h 6858000"/>
+              <a:gd name="connsiteX1" fmla="*/ 3233551 w 4446529"/>
+              <a:gd name="connsiteY1" fmla="*/ 0 h 6858000"/>
+              <a:gd name="connsiteX2" fmla="*/ 3296534 w 4446529"/>
+              <a:gd name="connsiteY2" fmla="*/ 69271 h 6858000"/>
+              <a:gd name="connsiteX3" fmla="*/ 4446529 w 4446529"/>
+              <a:gd name="connsiteY3" fmla="*/ 3429000 h 6858000"/>
+              <a:gd name="connsiteX4" fmla="*/ 3296534 w 4446529"/>
+              <a:gd name="connsiteY4" fmla="*/ 6788730 h 6858000"/>
+              <a:gd name="connsiteX5" fmla="*/ 3233551 w 4446529"/>
+              <a:gd name="connsiteY5" fmla="*/ 6858000 h 6858000"/>
+              <a:gd name="connsiteX6" fmla="*/ 0 w 4446529"/>
+              <a:gd name="connsiteY6" fmla="*/ 6858000 h 6858000"/>
+            </a:gdLst>
+            <a:ahLst/>
+            <a:cxnLst>
+              <a:cxn ang="0">
+                <a:pos x="connsiteX0" y="connsiteY0"/>
+              </a:cxn>
+              <a:cxn ang="0">
+                <a:pos x="connsiteX1" y="connsiteY1"/>
+              </a:cxn>
+              <a:cxn ang="0">
+                <a:pos x="connsiteX2" y="connsiteY2"/>
+              </a:cxn>
+              <a:cxn ang="0">
+                <a:pos x="connsiteX3" y="connsiteY3"/>
+              </a:cxn>
+              <a:cxn ang="0">
+                <a:pos x="connsiteX4" y="connsiteY4"/>
+              </a:cxn>
+              <a:cxn ang="0">
+                <a:pos x="connsiteX5" y="connsiteY5"/>
+              </a:cxn>
+              <a:cxn ang="0">
+                <a:pos x="connsiteX6" y="connsiteY6"/>
+              </a:cxn>
+            </a:cxnLst>
+            <a:rect l="l" t="t" r="r" b="b"/>
+            <a:pathLst>
+              <a:path w="4446529" h="6858000">
+                <a:moveTo>
+                  <a:pt x="0" y="0"/>
+                </a:moveTo>
+                <a:lnTo>
+                  <a:pt x="3233551" y="0"/>
+                </a:lnTo>
+                <a:lnTo>
+                  <a:pt x="3296534" y="69271"/>
+                </a:lnTo>
+                <a:cubicBezTo>
+                  <a:pt x="4007060" y="929100"/>
+                  <a:pt x="4446529" y="2116944"/>
+                  <a:pt x="4446529" y="3429000"/>
+                </a:cubicBezTo>
+                <a:cubicBezTo>
+                  <a:pt x="4446529" y="4741056"/>
+                  <a:pt x="4007060" y="5928900"/>
+                  <a:pt x="3296534" y="6788730"/>
+                </a:cubicBezTo>
+                <a:lnTo>
+                  <a:pt x="3233551" y="6858000"/>
+                </a:lnTo>
+                <a:lnTo>
+                  <a:pt x="0" y="6858000"/>
+                </a:lnTo>
+                <a:close/>
+              </a:path>
+            </a:pathLst>
+          </a:custGeom>
+          <a:ln w="9525">
+            <a:noFill/>
+          </a:ln>
+          <a:effectLst/>
+        </p:spPr>
+        <p:style>
+          <a:lnRef idx="2">
+            <a:schemeClr val="accent1">
+              <a:shade val="50000"/>
+            </a:schemeClr>
+          </a:lnRef>
+          <a:fillRef idx="1">
+            <a:schemeClr val="accent1"/>
+          </a:fillRef>
+          <a:effectRef idx="0">
+            <a:schemeClr val="accent1"/>
+          </a:effectRef>
+          <a:fontRef idx="minor">
+            <a:schemeClr val="lt1"/>
+          </a:fontRef>
+        </p:style>
+        <p:txBody>
+          <a:bodyPr wrap="square" rtlCol="0" anchor="ctr">
+            <a:noAutofit/>
+          </a:bodyPr>
+          <a:lstStyle/>
+          <a:p>
+            <a:pPr marL="0" marR="0" lvl="0" indent="0" algn="ctr" defTabSz="914400" rtl="0" eaLnBrk="1" fontAlgn="auto" latinLnBrk="0" hangingPunct="1">
+              <a:lnSpc>
+                <a:spcPct val="100000"/>
+              </a:lnSpc>
+              <a:spcBef>
+                <a:spcPts val="0"/>
+              </a:spcBef>
+              <a:spcAft>
+                <a:spcPts val="0"/>
+              </a:spcAft>
+              <a:buClrTx/>
+              <a:buSzTx/>
+              <a:buFontTx/>
+              <a:buNone/>
+              <a:tabLst/>
+              <a:defRPr/>
+            </a:pPr>
+            <a:endParaRPr kumimoji="0" lang="en-US" sz="1800" b="0" i="0" u="none" strike="noStrike" kern="1200" cap="none" spc="0" normalizeH="0" baseline="0" noProof="0">
+              <a:ln>
+                <a:noFill/>
+              </a:ln>
+              <a:solidFill>
+                <a:prstClr val="white"/>
+              </a:solidFill>
+              <a:effectLst/>
+              <a:uLnTx/>
+              <a:uFillTx/>
+              <a:latin typeface="Calibri" panose="020F0502020204030204"/>
+              <a:ea typeface="+mn-ea"/>
+              <a:cs typeface="+mn-cs"/>
+            </a:endParaRPr>
+          </a:p>
+        </p:txBody>
+      </p:sp>
       <p:sp>
         <p:nvSpPr>
           <p:cNvPr id="2" name="Title 1">
@@ -10127,33 +10586,246 @@
             <p:ph type="title"/>
           </p:nvPr>
         </p:nvSpPr>
-        <p:spPr/>
+        <p:spPr>
+          <a:xfrm>
+            <a:off x="371094" y="1161288"/>
+            <a:ext cx="3438144" cy="1239012"/>
+          </a:xfrm>
+        </p:spPr>
         <p:txBody>
-          <a:bodyPr/>
+          <a:bodyPr anchor="ctr">
+            <a:normAutofit/>
+          </a:bodyPr>
           <a:lstStyle/>
           <a:p>
             <a:r>
-              <a:rPr lang="en-US" dirty="0"/>
+              <a:rPr lang="en-US" sz="2800"/>
               <a:t>Test</a:t>
+            </a:r>
+          </a:p>
+        </p:txBody>
+      </p:sp>
+      <p:sp>
+        <p:nvSpPr>
+          <p:cNvPr id="19" name="Rectangle 18">
+            <a:extLst>
+              <a:ext uri="{FF2B5EF4-FFF2-40B4-BE49-F238E27FC236}">
+                <a16:creationId xmlns:a16="http://schemas.microsoft.com/office/drawing/2014/main" id="{98E79BE4-34FE-485A-98A5-92CE8F7C4743}"/>
+              </a:ext>
+              <a:ext uri="{C183D7F6-B498-43B3-948B-1728B52AA6E4}">
+                <adec:decorative xmlns:adec="http://schemas.microsoft.com/office/drawing/2017/decorative" val="1"/>
+              </a:ext>
+            </a:extLst>
+          </p:cNvPr>
+          <p:cNvSpPr>
+            <a:spLocks noGrp="1" noRot="1" noChangeAspect="1" noMove="1" noResize="1" noEditPoints="1" noAdjustHandles="1" noChangeArrowheads="1" noChangeShapeType="1" noTextEdit="1"/>
+          </p:cNvSpPr>
+          <p:nvPr>
+            <p:extLst>
+              <p:ext uri="{386F3935-93C4-4BCD-93E2-E3B085C9AB24}">
+                <p16:designElem xmlns:p16="http://schemas.microsoft.com/office/powerpoint/2015/main" val="1"/>
+              </p:ext>
+            </p:extLst>
+          </p:nvPr>
+        </p:nvSpPr>
+        <p:spPr>
+          <a:xfrm>
+            <a:off x="0" y="1426546"/>
+            <a:ext cx="128016" cy="653903"/>
+          </a:xfrm>
+          <a:prstGeom prst="rect">
+            <a:avLst/>
+          </a:prstGeom>
+          <a:solidFill>
+            <a:schemeClr val="accent2"/>
+          </a:solidFill>
+          <a:ln>
+            <a:noFill/>
+          </a:ln>
+        </p:spPr>
+        <p:style>
+          <a:lnRef idx="2">
+            <a:schemeClr val="accent1">
+              <a:shade val="50000"/>
+            </a:schemeClr>
+          </a:lnRef>
+          <a:fillRef idx="1">
+            <a:schemeClr val="accent1"/>
+          </a:fillRef>
+          <a:effectRef idx="0">
+            <a:schemeClr val="accent1"/>
+          </a:effectRef>
+          <a:fontRef idx="minor">
+            <a:schemeClr val="lt1"/>
+          </a:fontRef>
+        </p:style>
+        <p:txBody>
+          <a:bodyPr rtlCol="0" anchor="ctr"/>
+          <a:lstStyle/>
+          <a:p>
+            <a:pPr algn="ctr"/>
+            <a:endParaRPr lang="en-US">
+              <a:solidFill>
+                <a:prstClr val="white"/>
+              </a:solidFill>
+              <a:latin typeface="Calibri" panose="020F0502020204030204"/>
+            </a:endParaRPr>
+          </a:p>
+        </p:txBody>
+      </p:sp>
+      <p:sp>
+        <p:nvSpPr>
+          <p:cNvPr id="21" name="Rectangle 20">
+            <a:extLst>
+              <a:ext uri="{FF2B5EF4-FFF2-40B4-BE49-F238E27FC236}">
+                <a16:creationId xmlns:a16="http://schemas.microsoft.com/office/drawing/2014/main" id="{7A5F0580-5EE9-419F-96EE-B6529EF6E7D0}"/>
+              </a:ext>
+              <a:ext uri="{C183D7F6-B498-43B3-948B-1728B52AA6E4}">
+                <adec:decorative xmlns:adec="http://schemas.microsoft.com/office/drawing/2017/decorative" val="1"/>
+              </a:ext>
+            </a:extLst>
+          </p:cNvPr>
+          <p:cNvSpPr>
+            <a:spLocks noGrp="1" noRot="1" noChangeAspect="1" noMove="1" noResize="1" noEditPoints="1" noAdjustHandles="1" noChangeArrowheads="1" noChangeShapeType="1" noTextEdit="1"/>
+          </p:cNvSpPr>
+          <p:nvPr>
+            <p:extLst>
+              <p:ext uri="{386F3935-93C4-4BCD-93E2-E3B085C9AB24}">
+                <p16:designElem xmlns:p16="http://schemas.microsoft.com/office/powerpoint/2015/main" val="1"/>
+              </p:ext>
+            </p:extLst>
+          </p:nvPr>
+        </p:nvSpPr>
+        <p:spPr>
+          <a:xfrm>
+            <a:off x="395893" y="2443480"/>
+            <a:ext cx="3383280" cy="18288"/>
+          </a:xfrm>
+          <a:prstGeom prst="rect">
+            <a:avLst/>
+          </a:prstGeom>
+          <a:solidFill>
+            <a:srgbClr val="D5D5D5"/>
+          </a:solidFill>
+          <a:ln w="3175">
+            <a:noFill/>
+          </a:ln>
+          <a:effectLst/>
+        </p:spPr>
+        <p:style>
+          <a:lnRef idx="2">
+            <a:schemeClr val="accent1">
+              <a:shade val="50000"/>
+            </a:schemeClr>
+          </a:lnRef>
+          <a:fillRef idx="1">
+            <a:schemeClr val="accent1"/>
+          </a:fillRef>
+          <a:effectRef idx="0">
+            <a:schemeClr val="accent1"/>
+          </a:effectRef>
+          <a:fontRef idx="minor">
+            <a:schemeClr val="lt1"/>
+          </a:fontRef>
+        </p:style>
+        <p:txBody>
+          <a:bodyPr rtlCol="0" anchor="ctr"/>
+          <a:lstStyle/>
+          <a:p>
+            <a:pPr marL="0" marR="0" lvl="0" indent="0" algn="ctr" defTabSz="914400" rtl="0" eaLnBrk="1" fontAlgn="auto" latinLnBrk="0" hangingPunct="1">
+              <a:lnSpc>
+                <a:spcPct val="100000"/>
+              </a:lnSpc>
+              <a:spcBef>
+                <a:spcPts val="0"/>
+              </a:spcBef>
+              <a:spcAft>
+                <a:spcPts val="0"/>
+              </a:spcAft>
+              <a:buClrTx/>
+              <a:buSzTx/>
+              <a:buFontTx/>
+              <a:buNone/>
+              <a:tabLst/>
+              <a:defRPr/>
+            </a:pPr>
+            <a:endParaRPr kumimoji="0" lang="en-US" sz="1800" b="0" i="0" u="none" strike="noStrike" kern="1200" cap="none" spc="0" normalizeH="0" baseline="0" noProof="0">
+              <a:ln>
+                <a:noFill/>
+              </a:ln>
+              <a:solidFill>
+                <a:prstClr val="white"/>
+              </a:solidFill>
+              <a:effectLst/>
+              <a:uLnTx/>
+              <a:uFillTx/>
+              <a:latin typeface="Calibri" panose="020F0502020204030204"/>
+              <a:ea typeface="+mn-ea"/>
+              <a:cs typeface="+mn-cs"/>
+            </a:endParaRPr>
+          </a:p>
+        </p:txBody>
+      </p:sp>
+      <p:sp>
+        <p:nvSpPr>
+          <p:cNvPr id="10" name="Content Placeholder 9">
+            <a:extLst>
+              <a:ext uri="{FF2B5EF4-FFF2-40B4-BE49-F238E27FC236}">
+                <a16:creationId xmlns:a16="http://schemas.microsoft.com/office/drawing/2014/main" id="{80E2FC43-8678-FF06-6466-957D3407E428}"/>
+              </a:ext>
+            </a:extLst>
+          </p:cNvPr>
+          <p:cNvSpPr>
+            <a:spLocks noGrp="1"/>
+          </p:cNvSpPr>
+          <p:nvPr>
+            <p:ph idx="1"/>
+          </p:nvPr>
+        </p:nvSpPr>
+        <p:spPr>
+          <a:xfrm>
+            <a:off x="371094" y="2718054"/>
+            <a:ext cx="3438906" cy="3207258"/>
+          </a:xfrm>
+        </p:spPr>
+        <p:txBody>
+          <a:bodyPr anchor="t">
+            <a:normAutofit/>
+          </a:bodyPr>
+          <a:lstStyle/>
+          <a:p>
+            <a:r>
+              <a:rPr lang="en-US" sz="1700" dirty="0"/>
+              <a:t>Look up reservation using email address</a:t>
+            </a:r>
+          </a:p>
+          <a:p>
+            <a:r>
+              <a:rPr lang="en-US" sz="1700" dirty="0"/>
+              <a:t>Displays results from the database indicating the customers reservation</a:t>
+            </a:r>
+          </a:p>
+          <a:p>
+            <a:r>
+              <a:rPr lang="en-US" sz="1700" dirty="0"/>
+              <a:t>Result: Pass</a:t>
             </a:r>
           </a:p>
         </p:txBody>
       </p:sp>
       <p:pic>
         <p:nvPicPr>
-          <p:cNvPr id="6" name="Content Placeholder 5">
-            <a:extLst>
-              <a:ext uri="{FF2B5EF4-FFF2-40B4-BE49-F238E27FC236}">
-                <a16:creationId xmlns:a16="http://schemas.microsoft.com/office/drawing/2014/main" id="{EA60DE4B-2692-F634-1B1C-147AADBECAB9}"/>
+          <p:cNvPr id="3" name="Content Placeholder 5">
+            <a:extLst>
+              <a:ext uri="{FF2B5EF4-FFF2-40B4-BE49-F238E27FC236}">
+                <a16:creationId xmlns:a16="http://schemas.microsoft.com/office/drawing/2014/main" id="{A21654E2-E8A9-C0D9-C20E-5FB7E48D928C}"/>
               </a:ext>
             </a:extLst>
           </p:cNvPr>
           <p:cNvPicPr>
-            <a:picLocks noGrp="1" noChangeAspect="1"/>
+            <a:picLocks noChangeAspect="1"/>
           </p:cNvPicPr>
-          <p:nvPr>
-            <p:ph idx="1"/>
-          </p:nvPr>
+          <p:nvPr/>
         </p:nvPicPr>
         <p:blipFill>
           <a:blip r:embed="rId2"/>
@@ -10163,15 +10835,18 @@
         </p:blipFill>
         <p:spPr>
           <a:xfrm>
-            <a:off x="2447476" y="1825625"/>
+            <a:off x="4523859" y="1426546"/>
             <a:ext cx="7297047" cy="4351338"/>
           </a:xfrm>
+          <a:prstGeom prst="rect">
+            <a:avLst/>
+          </a:prstGeom>
         </p:spPr>
       </p:pic>
     </p:spTree>
     <p:extLst>
       <p:ext uri="{BB962C8B-B14F-4D97-AF65-F5344CB8AC3E}">
-        <p14:creationId xmlns:p14="http://schemas.microsoft.com/office/powerpoint/2010/main" val="1558861955"/>
+        <p14:creationId xmlns:p14="http://schemas.microsoft.com/office/powerpoint/2010/main" val="4035139853"/>
       </p:ext>
     </p:extLst>
   </p:cSld>
@@ -10630,7 +11305,7 @@
             <p:ph idx="1"/>
             <p:extLst>
               <p:ext uri="{D42A27DB-BD31-4B8C-83A1-F6EECF244321}">
-                <p14:modId xmlns:p14="http://schemas.microsoft.com/office/powerpoint/2010/main" val="149213084"/>
+                <p14:modId xmlns:p14="http://schemas.microsoft.com/office/powerpoint/2010/main" val="1930612825"/>
               </p:ext>
             </p:extLst>
           </p:nvPr>
@@ -14291,13 +14966,8 @@
           <a:p>
             <a:r>
               <a:rPr lang="en-US" dirty="0"/>
-              <a:t>We maintained a </a:t>
+              <a:t>We maintained a similar layout, but with cleaner lines.</a:t>
             </a:r>
-            <a:r>
-              <a:rPr lang="en-US"/>
-              <a:t>similar layout.</a:t>
-            </a:r>
-            <a:endParaRPr lang="en-US" dirty="0"/>
           </a:p>
         </p:txBody>
       </p:sp>
@@ -14773,7 +15443,22 @@
           </a:bodyPr>
           <a:lstStyle/>
           <a:p>
-            <a:endParaRPr lang="en-US" sz="1800"/>
+            <a:r>
+              <a:rPr lang="en-US" sz="1800" dirty="0"/>
+              <a:t>Reservation Summary Page</a:t>
+            </a:r>
+          </a:p>
+          <a:p>
+            <a:r>
+              <a:rPr lang="en-US" sz="1800" dirty="0"/>
+              <a:t>Similar to the production</a:t>
+            </a:r>
+          </a:p>
+          <a:p>
+            <a:r>
+              <a:rPr lang="en-US" sz="1800" dirty="0"/>
+              <a:t>Simplified with Dropdowns to allow for a single room type.</a:t>
+            </a:r>
           </a:p>
         </p:txBody>
       </p:sp>

</xml_diff>

<commit_message>
modified:   CSD460 CAPSTONE PRESENTATION.pptx
</commit_message>
<xml_diff>
--- a/CSD460 CAPSTONE PRESENTATION.pptx
+++ b/CSD460 CAPSTONE PRESENTATION.pptx
@@ -8,7 +8,7 @@
     <p:sldId id="256" r:id="rId2"/>
     <p:sldId id="257" r:id="rId3"/>
     <p:sldId id="259" r:id="rId4"/>
-    <p:sldId id="260" r:id="rId5"/>
+    <p:sldId id="273" r:id="rId5"/>
     <p:sldId id="261" r:id="rId6"/>
     <p:sldId id="265" r:id="rId7"/>
     <p:sldId id="267" r:id="rId8"/>
@@ -4030,7 +4030,7 @@
           <a:p>
             <a:fld id="{3F6C141F-735A-4819-ABAA-5835E79837FA}" type="datetimeFigureOut">
               <a:rPr lang="en-US" smtClean="0"/>
-              <a:t>12/9/23</a:t>
+              <a:t>12/10/23</a:t>
             </a:fld>
             <a:endParaRPr lang="en-US"/>
           </a:p>
@@ -4228,7 +4228,7 @@
           <a:p>
             <a:fld id="{3F6C141F-735A-4819-ABAA-5835E79837FA}" type="datetimeFigureOut">
               <a:rPr lang="en-US" smtClean="0"/>
-              <a:t>12/9/23</a:t>
+              <a:t>12/10/23</a:t>
             </a:fld>
             <a:endParaRPr lang="en-US"/>
           </a:p>
@@ -4436,7 +4436,7 @@
           <a:p>
             <a:fld id="{3F6C141F-735A-4819-ABAA-5835E79837FA}" type="datetimeFigureOut">
               <a:rPr lang="en-US" smtClean="0"/>
-              <a:t>12/9/23</a:t>
+              <a:t>12/10/23</a:t>
             </a:fld>
             <a:endParaRPr lang="en-US"/>
           </a:p>
@@ -4634,7 +4634,7 @@
           <a:p>
             <a:fld id="{3F6C141F-735A-4819-ABAA-5835E79837FA}" type="datetimeFigureOut">
               <a:rPr lang="en-US" smtClean="0"/>
-              <a:t>12/9/23</a:t>
+              <a:t>12/10/23</a:t>
             </a:fld>
             <a:endParaRPr lang="en-US"/>
           </a:p>
@@ -4909,7 +4909,7 @@
           <a:p>
             <a:fld id="{3F6C141F-735A-4819-ABAA-5835E79837FA}" type="datetimeFigureOut">
               <a:rPr lang="en-US" smtClean="0"/>
-              <a:t>12/9/23</a:t>
+              <a:t>12/10/23</a:t>
             </a:fld>
             <a:endParaRPr lang="en-US"/>
           </a:p>
@@ -5174,7 +5174,7 @@
           <a:p>
             <a:fld id="{3F6C141F-735A-4819-ABAA-5835E79837FA}" type="datetimeFigureOut">
               <a:rPr lang="en-US" smtClean="0"/>
-              <a:t>12/9/23</a:t>
+              <a:t>12/10/23</a:t>
             </a:fld>
             <a:endParaRPr lang="en-US"/>
           </a:p>
@@ -5586,7 +5586,7 @@
           <a:p>
             <a:fld id="{3F6C141F-735A-4819-ABAA-5835E79837FA}" type="datetimeFigureOut">
               <a:rPr lang="en-US" smtClean="0"/>
-              <a:t>12/9/23</a:t>
+              <a:t>12/10/23</a:t>
             </a:fld>
             <a:endParaRPr lang="en-US"/>
           </a:p>
@@ -5727,7 +5727,7 @@
           <a:p>
             <a:fld id="{3F6C141F-735A-4819-ABAA-5835E79837FA}" type="datetimeFigureOut">
               <a:rPr lang="en-US" smtClean="0"/>
-              <a:t>12/9/23</a:t>
+              <a:t>12/10/23</a:t>
             </a:fld>
             <a:endParaRPr lang="en-US"/>
           </a:p>
@@ -5840,7 +5840,7 @@
           <a:p>
             <a:fld id="{3F6C141F-735A-4819-ABAA-5835E79837FA}" type="datetimeFigureOut">
               <a:rPr lang="en-US" smtClean="0"/>
-              <a:t>12/9/23</a:t>
+              <a:t>12/10/23</a:t>
             </a:fld>
             <a:endParaRPr lang="en-US"/>
           </a:p>
@@ -6151,7 +6151,7 @@
           <a:p>
             <a:fld id="{3F6C141F-735A-4819-ABAA-5835E79837FA}" type="datetimeFigureOut">
               <a:rPr lang="en-US" smtClean="0"/>
-              <a:t>12/9/23</a:t>
+              <a:t>12/10/23</a:t>
             </a:fld>
             <a:endParaRPr lang="en-US"/>
           </a:p>
@@ -6439,7 +6439,7 @@
           <a:p>
             <a:fld id="{3F6C141F-735A-4819-ABAA-5835E79837FA}" type="datetimeFigureOut">
               <a:rPr lang="en-US" smtClean="0"/>
-              <a:t>12/9/23</a:t>
+              <a:t>12/10/23</a:t>
             </a:fld>
             <a:endParaRPr lang="en-US"/>
           </a:p>
@@ -6680,7 +6680,7 @@
           <a:p>
             <a:fld id="{3F6C141F-735A-4819-ABAA-5835E79837FA}" type="datetimeFigureOut">
               <a:rPr lang="en-US" smtClean="0"/>
-              <a:t>12/9/23</a:t>
+              <a:t>12/10/23</a:t>
             </a:fld>
             <a:endParaRPr lang="en-US"/>
           </a:p>
@@ -12320,7 +12320,7 @@
           <p:cNvPr id="8" name="Rectangle 7">
             <a:extLst>
               <a:ext uri="{FF2B5EF4-FFF2-40B4-BE49-F238E27FC236}">
-                <a16:creationId xmlns:a16="http://schemas.microsoft.com/office/drawing/2014/main" id="{9AFC454B-A080-4D23-B177-6D5356C6E6EF}"/>
+                <a16:creationId xmlns:a16="http://schemas.microsoft.com/office/drawing/2014/main" id="{907EF6B7-1338-4443-8C46-6A318D952DFD}"/>
               </a:ext>
               <a:ext uri="{C183D7F6-B498-43B3-948B-1728B52AA6E4}">
                 <adec:decorative xmlns:adec="http://schemas.microsoft.com/office/drawing/2017/decorative" val="1"/>
@@ -12377,10 +12377,10 @@
       </p:sp>
       <p:sp>
         <p:nvSpPr>
-          <p:cNvPr id="10" name="Rectangle 9">
-            <a:extLst>
-              <a:ext uri="{FF2B5EF4-FFF2-40B4-BE49-F238E27FC236}">
-                <a16:creationId xmlns:a16="http://schemas.microsoft.com/office/drawing/2014/main" id="{D0522C2C-7B5C-48A7-A969-03941E5D2E76}"/>
+          <p:cNvPr id="10" name="Freeform: Shape 9">
+            <a:extLst>
+              <a:ext uri="{FF2B5EF4-FFF2-40B4-BE49-F238E27FC236}">
+                <a16:creationId xmlns:a16="http://schemas.microsoft.com/office/drawing/2014/main" id="{DAAE4CDD-124C-4DCF-9584-B6033B545DD5}"/>
               </a:ext>
               <a:ext uri="{C183D7F6-B498-43B3-948B-1728B52AA6E4}">
                 <adec:decorative xmlns:adec="http://schemas.microsoft.com/office/drawing/2017/decorative" val="1"/>
@@ -12400,12 +12400,83 @@
         </p:nvSpPr>
         <p:spPr>
           <a:xfrm>
-            <a:off x="0" y="-9427"/>
-            <a:ext cx="12192000" cy="6858000"/>
+            <a:off x="1" y="0"/>
+            <a:ext cx="4167271" cy="6858000"/>
           </a:xfrm>
-          <a:prstGeom prst="rect">
+          <a:custGeom>
             <a:avLst/>
-          </a:prstGeom>
+            <a:gdLst>
+              <a:gd name="connsiteX0" fmla="*/ 0 w 4167271"/>
+              <a:gd name="connsiteY0" fmla="*/ 0 h 6858000"/>
+              <a:gd name="connsiteX1" fmla="*/ 2259550 w 4167271"/>
+              <a:gd name="connsiteY1" fmla="*/ 0 h 6858000"/>
+              <a:gd name="connsiteX2" fmla="*/ 2387803 w 4167271"/>
+              <a:gd name="connsiteY2" fmla="*/ 82222 h 6858000"/>
+              <a:gd name="connsiteX3" fmla="*/ 4167271 w 4167271"/>
+              <a:gd name="connsiteY3" fmla="*/ 3429000 h 6858000"/>
+              <a:gd name="connsiteX4" fmla="*/ 2387803 w 4167271"/>
+              <a:gd name="connsiteY4" fmla="*/ 6775779 h 6858000"/>
+              <a:gd name="connsiteX5" fmla="*/ 2259550 w 4167271"/>
+              <a:gd name="connsiteY5" fmla="*/ 6858000 h 6858000"/>
+              <a:gd name="connsiteX6" fmla="*/ 0 w 4167271"/>
+              <a:gd name="connsiteY6" fmla="*/ 6858000 h 6858000"/>
+            </a:gdLst>
+            <a:ahLst/>
+            <a:cxnLst>
+              <a:cxn ang="0">
+                <a:pos x="connsiteX0" y="connsiteY0"/>
+              </a:cxn>
+              <a:cxn ang="0">
+                <a:pos x="connsiteX1" y="connsiteY1"/>
+              </a:cxn>
+              <a:cxn ang="0">
+                <a:pos x="connsiteX2" y="connsiteY2"/>
+              </a:cxn>
+              <a:cxn ang="0">
+                <a:pos x="connsiteX3" y="connsiteY3"/>
+              </a:cxn>
+              <a:cxn ang="0">
+                <a:pos x="connsiteX4" y="connsiteY4"/>
+              </a:cxn>
+              <a:cxn ang="0">
+                <a:pos x="connsiteX5" y="connsiteY5"/>
+              </a:cxn>
+              <a:cxn ang="0">
+                <a:pos x="connsiteX6" y="connsiteY6"/>
+              </a:cxn>
+            </a:cxnLst>
+            <a:rect l="l" t="t" r="r" b="b"/>
+            <a:pathLst>
+              <a:path w="4167271" h="6858000">
+                <a:moveTo>
+                  <a:pt x="0" y="0"/>
+                </a:moveTo>
+                <a:lnTo>
+                  <a:pt x="2259550" y="0"/>
+                </a:lnTo>
+                <a:lnTo>
+                  <a:pt x="2387803" y="82222"/>
+                </a:lnTo>
+                <a:cubicBezTo>
+                  <a:pt x="3461407" y="807534"/>
+                  <a:pt x="4167271" y="2035835"/>
+                  <a:pt x="4167271" y="3429000"/>
+                </a:cubicBezTo>
+                <a:cubicBezTo>
+                  <a:pt x="4167271" y="4822165"/>
+                  <a:pt x="3461407" y="6050467"/>
+                  <a:pt x="2387803" y="6775779"/>
+                </a:cubicBezTo>
+                <a:lnTo>
+                  <a:pt x="2259550" y="6858000"/>
+                </a:lnTo>
+                <a:lnTo>
+                  <a:pt x="0" y="6858000"/>
+                </a:lnTo>
+                <a:close/>
+              </a:path>
+            </a:pathLst>
+          </a:custGeom>
           <a:solidFill>
             <a:schemeClr val="accent2"/>
           </a:solidFill>
@@ -12434,20 +12505,55 @@
           <a:lstStyle/>
           <a:p>
             <a:pPr algn="ctr"/>
-            <a:endParaRPr lang="en-US">
-              <a:solidFill>
-                <a:schemeClr val="tx1"/>
-              </a:solidFill>
-            </a:endParaRPr>
+            <a:endParaRPr lang="en-US"/>
           </a:p>
         </p:txBody>
       </p:sp>
       <p:sp>
         <p:nvSpPr>
-          <p:cNvPr id="12" name="Freeform 13">
-            <a:extLst>
-              <a:ext uri="{FF2B5EF4-FFF2-40B4-BE49-F238E27FC236}">
-                <a16:creationId xmlns:a16="http://schemas.microsoft.com/office/drawing/2014/main" id="{9C682A1A-5B2D-4111-BBD6-620165633E5B}"/>
+          <p:cNvPr id="2" name="Title 1">
+            <a:extLst>
+              <a:ext uri="{FF2B5EF4-FFF2-40B4-BE49-F238E27FC236}">
+                <a16:creationId xmlns:a16="http://schemas.microsoft.com/office/drawing/2014/main" id="{9E001B49-2F0D-3F9D-D536-08C5DA1B4CE3}"/>
+              </a:ext>
+            </a:extLst>
+          </p:cNvPr>
+          <p:cNvSpPr>
+            <a:spLocks noGrp="1"/>
+          </p:cNvSpPr>
+          <p:nvPr>
+            <p:ph type="title"/>
+          </p:nvPr>
+        </p:nvSpPr>
+        <p:spPr>
+          <a:xfrm>
+            <a:off x="686834" y="1153572"/>
+            <a:ext cx="3200400" cy="4461163"/>
+          </a:xfrm>
+        </p:spPr>
+        <p:txBody>
+          <a:bodyPr>
+            <a:normAutofit/>
+          </a:bodyPr>
+          <a:lstStyle/>
+          <a:p>
+            <a:r>
+              <a:rPr lang="en-US">
+                <a:solidFill>
+                  <a:srgbClr val="FFFFFF"/>
+                </a:solidFill>
+              </a:rPr>
+              <a:t>Team Introduction</a:t>
+            </a:r>
+          </a:p>
+        </p:txBody>
+      </p:sp>
+      <p:sp>
+        <p:nvSpPr>
+          <p:cNvPr id="12" name="Arc 11">
+            <a:extLst>
+              <a:ext uri="{FF2B5EF4-FFF2-40B4-BE49-F238E27FC236}">
+                <a16:creationId xmlns:a16="http://schemas.microsoft.com/office/drawing/2014/main" id="{081E4A58-353D-44AE-B2FC-2A74E2E400F7}"/>
               </a:ext>
               <a:ext uri="{C183D7F6-B498-43B3-948B-1728B52AA6E4}">
                 <adec:decorative xmlns:adec="http://schemas.microsoft.com/office/drawing/2017/decorative" val="1"/>
@@ -12466,289 +12572,18 @@
           </p:nvPr>
         </p:nvSpPr>
         <p:spPr>
-          <a:xfrm>
-            <a:off x="2769476" y="220196"/>
-            <a:ext cx="9422524" cy="6637806"/>
-          </a:xfrm>
-          <a:custGeom>
-            <a:avLst/>
-            <a:gdLst>
-              <a:gd name="connsiteX0" fmla="*/ 4929467 w 8191500"/>
-              <a:gd name="connsiteY0" fmla="*/ 0 h 5770597"/>
-              <a:gd name="connsiteX1" fmla="*/ 8065066 w 8191500"/>
-              <a:gd name="connsiteY1" fmla="*/ 1118513 h 5770597"/>
-              <a:gd name="connsiteX2" fmla="*/ 8191500 w 8191500"/>
-              <a:gd name="connsiteY2" fmla="*/ 1227339 h 5770597"/>
-              <a:gd name="connsiteX3" fmla="*/ 8191500 w 8191500"/>
-              <a:gd name="connsiteY3" fmla="*/ 5770597 h 5770597"/>
-              <a:gd name="connsiteX4" fmla="*/ 79523 w 8191500"/>
-              <a:gd name="connsiteY4" fmla="*/ 5770597 h 5770597"/>
-              <a:gd name="connsiteX5" fmla="*/ 56799 w 8191500"/>
-              <a:gd name="connsiteY5" fmla="*/ 5644158 h 5770597"/>
-              <a:gd name="connsiteX6" fmla="*/ 0 w 8191500"/>
-              <a:gd name="connsiteY6" fmla="*/ 4898209 h 5770597"/>
-              <a:gd name="connsiteX7" fmla="*/ 4929467 w 8191500"/>
-              <a:gd name="connsiteY7" fmla="*/ 0 h 5770597"/>
-            </a:gdLst>
-            <a:ahLst/>
-            <a:cxnLst>
-              <a:cxn ang="0">
-                <a:pos x="connsiteX0" y="connsiteY0"/>
-              </a:cxn>
-              <a:cxn ang="0">
-                <a:pos x="connsiteX1" y="connsiteY1"/>
-              </a:cxn>
-              <a:cxn ang="0">
-                <a:pos x="connsiteX2" y="connsiteY2"/>
-              </a:cxn>
-              <a:cxn ang="0">
-                <a:pos x="connsiteX3" y="connsiteY3"/>
-              </a:cxn>
-              <a:cxn ang="0">
-                <a:pos x="connsiteX4" y="connsiteY4"/>
-              </a:cxn>
-              <a:cxn ang="0">
-                <a:pos x="connsiteX5" y="connsiteY5"/>
-              </a:cxn>
-              <a:cxn ang="0">
-                <a:pos x="connsiteX6" y="connsiteY6"/>
-              </a:cxn>
-              <a:cxn ang="0">
-                <a:pos x="connsiteX7" y="connsiteY7"/>
-              </a:cxn>
-            </a:cxnLst>
-            <a:rect l="l" t="t" r="r" b="b"/>
-            <a:pathLst>
-              <a:path w="8191500" h="5770597">
-                <a:moveTo>
-                  <a:pt x="4929467" y="0"/>
-                </a:moveTo>
-                <a:cubicBezTo>
-                  <a:pt x="6120547" y="0"/>
-                  <a:pt x="7212963" y="419755"/>
-                  <a:pt x="8065066" y="1118513"/>
-                </a:cubicBezTo>
-                <a:lnTo>
-                  <a:pt x="8191500" y="1227339"/>
-                </a:lnTo>
-                <a:lnTo>
-                  <a:pt x="8191500" y="5770597"/>
-                </a:lnTo>
-                <a:lnTo>
-                  <a:pt x="79523" y="5770597"/>
-                </a:lnTo>
-                <a:lnTo>
-                  <a:pt x="56799" y="5644158"/>
-                </a:lnTo>
-                <a:cubicBezTo>
-                  <a:pt x="19398" y="5400934"/>
-                  <a:pt x="0" y="5151822"/>
-                  <a:pt x="0" y="4898209"/>
-                </a:cubicBezTo>
-                <a:cubicBezTo>
-                  <a:pt x="0" y="2193003"/>
-                  <a:pt x="2206998" y="0"/>
-                  <a:pt x="4929467" y="0"/>
-                </a:cubicBezTo>
-                <a:close/>
-              </a:path>
-            </a:pathLst>
-          </a:custGeom>
-          <a:solidFill>
-            <a:schemeClr val="bg1"/>
-          </a:solidFill>
-          <a:ln>
-            <a:noFill/>
-          </a:ln>
-        </p:spPr>
-        <p:style>
-          <a:lnRef idx="2">
-            <a:schemeClr val="accent1">
-              <a:shade val="50000"/>
-            </a:schemeClr>
-          </a:lnRef>
-          <a:fillRef idx="1">
-            <a:schemeClr val="accent1"/>
-          </a:fillRef>
-          <a:effectRef idx="0">
-            <a:schemeClr val="accent1"/>
-          </a:effectRef>
-          <a:fontRef idx="minor">
-            <a:schemeClr val="lt1"/>
-          </a:fontRef>
-        </p:style>
-        <p:txBody>
-          <a:bodyPr wrap="square" rtlCol="0" anchor="ctr">
-            <a:noAutofit/>
-          </a:bodyPr>
-          <a:lstStyle/>
-          <a:p>
-            <a:pPr marL="0" marR="0" lvl="0" indent="0" algn="ctr" defTabSz="914400" rtl="0" eaLnBrk="1" fontAlgn="auto" latinLnBrk="0" hangingPunct="1">
-              <a:lnSpc>
-                <a:spcPct val="100000"/>
-              </a:lnSpc>
-              <a:spcBef>
-                <a:spcPts val="0"/>
-              </a:spcBef>
-              <a:spcAft>
-                <a:spcPts val="0"/>
-              </a:spcAft>
-              <a:buClrTx/>
-              <a:buSzTx/>
-              <a:buFontTx/>
-              <a:buNone/>
-              <a:tabLst/>
-              <a:defRPr/>
-            </a:pPr>
-            <a:endParaRPr kumimoji="0" lang="en-US" sz="1800" b="0" i="0" u="none" strike="noStrike" kern="1200" cap="none" spc="0" normalizeH="0" baseline="0" noProof="0">
-              <a:ln>
-                <a:noFill/>
-              </a:ln>
-              <a:solidFill>
-                <a:srgbClr val="FFFFFF"/>
-              </a:solidFill>
-              <a:effectLst/>
-              <a:uLnTx/>
-              <a:uFillTx/>
-              <a:latin typeface="Calibri" panose="020F0502020204030204"/>
-              <a:ea typeface="+mn-ea"/>
-              <a:cs typeface="+mn-cs"/>
-            </a:endParaRPr>
-          </a:p>
-        </p:txBody>
-      </p:sp>
-      <p:sp>
-        <p:nvSpPr>
-          <p:cNvPr id="14" name="Oval 13">
-            <a:extLst>
-              <a:ext uri="{FF2B5EF4-FFF2-40B4-BE49-F238E27FC236}">
-                <a16:creationId xmlns:a16="http://schemas.microsoft.com/office/drawing/2014/main" id="{D6EE29F2-D77F-4BD0-A20B-334D316A1C9D}"/>
-              </a:ext>
-              <a:ext uri="{C183D7F6-B498-43B3-948B-1728B52AA6E4}">
-                <adec:decorative xmlns:adec="http://schemas.microsoft.com/office/drawing/2017/decorative" val="1"/>
-              </a:ext>
-            </a:extLst>
-          </p:cNvPr>
-          <p:cNvSpPr>
-            <a:spLocks noGrp="1" noRot="1" noChangeAspect="1" noMove="1" noResize="1" noEditPoints="1" noAdjustHandles="1" noChangeArrowheads="1" noChangeShapeType="1" noTextEdit="1"/>
-          </p:cNvSpPr>
-          <p:nvPr>
-            <p:extLst>
-              <p:ext uri="{386F3935-93C4-4BCD-93E2-E3B085C9AB24}">
-                <p16:designElem xmlns:p16="http://schemas.microsoft.com/office/powerpoint/2015/main" val="1"/>
-              </p:ext>
-            </p:extLst>
-          </p:nvPr>
-        </p:nvSpPr>
-        <p:spPr>
-          <a:xfrm>
-            <a:off x="1758029" y="3334786"/>
-            <a:ext cx="1942241" cy="1889551"/>
-          </a:xfrm>
-          <a:prstGeom prst="ellipse">
-            <a:avLst/>
-          </a:prstGeom>
-          <a:solidFill>
-            <a:schemeClr val="accent4"/>
-          </a:solidFill>
-          <a:ln>
-            <a:noFill/>
-          </a:ln>
-        </p:spPr>
-        <p:style>
-          <a:lnRef idx="2">
-            <a:schemeClr val="accent1">
-              <a:shade val="50000"/>
-            </a:schemeClr>
-          </a:lnRef>
-          <a:fillRef idx="1">
-            <a:schemeClr val="accent1"/>
-          </a:fillRef>
-          <a:effectRef idx="0">
-            <a:schemeClr val="accent1"/>
-          </a:effectRef>
-          <a:fontRef idx="minor">
-            <a:schemeClr val="lt1"/>
-          </a:fontRef>
-        </p:style>
-        <p:txBody>
-          <a:bodyPr rtlCol="0" anchor="ctr"/>
-          <a:lstStyle/>
-          <a:p>
-            <a:pPr marL="0" marR="0" lvl="0" indent="0" algn="ctr" defTabSz="914400" rtl="0" eaLnBrk="1" fontAlgn="auto" latinLnBrk="0" hangingPunct="1">
-              <a:lnSpc>
-                <a:spcPct val="100000"/>
-              </a:lnSpc>
-              <a:spcBef>
-                <a:spcPts val="0"/>
-              </a:spcBef>
-              <a:spcAft>
-                <a:spcPts val="0"/>
-              </a:spcAft>
-              <a:buClrTx/>
-              <a:buSzTx/>
-              <a:buFontTx/>
-              <a:buNone/>
-              <a:tabLst/>
-              <a:defRPr/>
-            </a:pPr>
-            <a:endParaRPr kumimoji="0" lang="en-US" sz="1800" b="0" i="0" u="none" strike="noStrike" kern="1200" cap="none" spc="0" normalizeH="0" baseline="0" noProof="0">
-              <a:ln>
-                <a:noFill/>
-              </a:ln>
-              <a:solidFill>
-                <a:srgbClr val="FFFFFF"/>
-              </a:solidFill>
-              <a:effectLst/>
-              <a:uLnTx/>
-              <a:uFillTx/>
-              <a:latin typeface="Calibri" panose="020F0502020204030204"/>
-              <a:ea typeface="+mn-ea"/>
-              <a:cs typeface="+mn-cs"/>
-            </a:endParaRPr>
-          </a:p>
-        </p:txBody>
-      </p:sp>
-      <p:sp>
-        <p:nvSpPr>
-          <p:cNvPr id="16" name="Arc 15">
-            <a:extLst>
-              <a:ext uri="{FF2B5EF4-FFF2-40B4-BE49-F238E27FC236}">
-                <a16:creationId xmlns:a16="http://schemas.microsoft.com/office/drawing/2014/main" id="{22D09ED2-868F-42C6-866E-F92E0CEF314F}"/>
-              </a:ext>
-              <a:ext uri="{C183D7F6-B498-43B3-948B-1728B52AA6E4}">
-                <adec:decorative xmlns:adec="http://schemas.microsoft.com/office/drawing/2017/decorative" val="1"/>
-              </a:ext>
-            </a:extLst>
-          </p:cNvPr>
-          <p:cNvSpPr>
-            <a:spLocks noGrp="1" noRot="1" noChangeAspect="1" noMove="1" noResize="1" noEditPoints="1" noAdjustHandles="1" noChangeArrowheads="1" noChangeShapeType="1" noTextEdit="1"/>
-          </p:cNvSpPr>
-          <p:nvPr>
-            <p:extLst>
-              <p:ext uri="{386F3935-93C4-4BCD-93E2-E3B085C9AB24}">
-                <p16:designElem xmlns:p16="http://schemas.microsoft.com/office/powerpoint/2015/main" val="1"/>
-              </p:ext>
-            </p:extLst>
-          </p:nvPr>
-        </p:nvSpPr>
-        <p:spPr>
-          <a:xfrm rot="18520172">
-            <a:off x="1474479" y="1096414"/>
-            <a:ext cx="2987899" cy="2987899"/>
+          <a:xfrm flipV="1">
+            <a:off x="7550402" y="2455479"/>
+            <a:ext cx="4083433" cy="4083433"/>
           </a:xfrm>
           <a:prstGeom prst="arc">
-            <a:avLst>
-              <a:gd name="adj1" fmla="val 14455503"/>
-              <a:gd name="adj2" fmla="val 227775"/>
-            </a:avLst>
+            <a:avLst/>
           </a:prstGeom>
           <a:ln w="127000" cap="rnd">
             <a:solidFill>
               <a:schemeClr val="accent4"/>
             </a:solidFill>
             <a:prstDash val="dash"/>
-            <a:miter lim="800000"/>
           </a:ln>
         </p:spPr>
         <p:style>
@@ -12769,80 +12604,8 @@
           <a:bodyPr rtlCol="0" anchor="ctr"/>
           <a:lstStyle/>
           <a:p>
-            <a:pPr marL="0" marR="0" lvl="0" indent="0" algn="ctr" defTabSz="914400" rtl="0" eaLnBrk="1" fontAlgn="auto" latinLnBrk="0" hangingPunct="1">
-              <a:lnSpc>
-                <a:spcPct val="100000"/>
-              </a:lnSpc>
-              <a:spcBef>
-                <a:spcPts val="0"/>
-              </a:spcBef>
-              <a:spcAft>
-                <a:spcPts val="0"/>
-              </a:spcAft>
-              <a:buClrTx/>
-              <a:buSzTx/>
-              <a:buFontTx/>
-              <a:buNone/>
-              <a:tabLst/>
-              <a:defRPr/>
-            </a:pPr>
-            <a:endParaRPr kumimoji="0" lang="en-US" sz="1800" b="0" i="0" u="none" strike="noStrike" kern="1200" cap="none" spc="0" normalizeH="0" baseline="0" noProof="0">
-              <a:ln>
-                <a:noFill/>
-              </a:ln>
-              <a:solidFill>
-                <a:srgbClr val="000000"/>
-              </a:solidFill>
-              <a:effectLst/>
-              <a:uLnTx/>
-              <a:uFillTx/>
-              <a:latin typeface="Calibri" panose="020F0502020204030204"/>
-              <a:ea typeface="+mn-ea"/>
-              <a:cs typeface="+mn-cs"/>
-            </a:endParaRPr>
-          </a:p>
-        </p:txBody>
-      </p:sp>
-      <p:sp>
-        <p:nvSpPr>
-          <p:cNvPr id="2" name="Title 1">
-            <a:extLst>
-              <a:ext uri="{FF2B5EF4-FFF2-40B4-BE49-F238E27FC236}">
-                <a16:creationId xmlns:a16="http://schemas.microsoft.com/office/drawing/2014/main" id="{963896C9-7EA9-E85A-A256-AC437DC0024F}"/>
-              </a:ext>
-            </a:extLst>
-          </p:cNvPr>
-          <p:cNvSpPr>
-            <a:spLocks noGrp="1"/>
-          </p:cNvSpPr>
-          <p:nvPr>
-            <p:ph type="title"/>
-          </p:nvPr>
-        </p:nvSpPr>
-        <p:spPr>
-          <a:xfrm>
-            <a:off x="4038600" y="1939159"/>
-            <a:ext cx="7644627" cy="2751086"/>
-          </a:xfrm>
-        </p:spPr>
-        <p:txBody>
-          <a:bodyPr vert="horz" lIns="91440" tIns="45720" rIns="91440" bIns="45720" rtlCol="0" anchor="b">
-            <a:normAutofit/>
-          </a:bodyPr>
-          <a:lstStyle/>
-          <a:p>
-            <a:pPr algn="r"/>
-            <a:r>
-              <a:rPr lang="en-US" sz="6000" kern="1200">
-                <a:solidFill>
-                  <a:schemeClr val="tx1"/>
-                </a:solidFill>
-                <a:latin typeface="+mj-lt"/>
-                <a:ea typeface="+mj-ea"/>
-                <a:cs typeface="+mj-cs"/>
-              </a:rPr>
-              <a:t>Team Introduction</a:t>
-            </a:r>
+            <a:pPr algn="ctr"/>
+            <a:endParaRPr lang="en-US" dirty="0"/>
           </a:p>
         </p:txBody>
       </p:sp>
@@ -12851,7 +12614,7 @@
           <p:cNvPr id="3" name="Content Placeholder 2">
             <a:extLst>
               <a:ext uri="{FF2B5EF4-FFF2-40B4-BE49-F238E27FC236}">
-                <a16:creationId xmlns:a16="http://schemas.microsoft.com/office/drawing/2014/main" id="{906233CA-7FD3-A413-0058-CE6AFB4ADF18}"/>
+                <a16:creationId xmlns:a16="http://schemas.microsoft.com/office/drawing/2014/main" id="{DC68D507-B048-4727-AC6C-31ED0639A744}"/>
               </a:ext>
             </a:extLst>
           </p:cNvPr>
@@ -12864,135 +12627,89 @@
         </p:nvSpPr>
         <p:spPr>
           <a:xfrm>
-            <a:off x="4038600" y="4782320"/>
-            <a:ext cx="7644627" cy="1329443"/>
+            <a:off x="4447308" y="591344"/>
+            <a:ext cx="6906491" cy="5585619"/>
           </a:xfrm>
         </p:spPr>
         <p:txBody>
-          <a:bodyPr vert="horz" lIns="91440" tIns="45720" rIns="91440" bIns="45720" rtlCol="0">
+          <a:bodyPr anchor="ctr">
             <a:normAutofit/>
           </a:bodyPr>
           <a:lstStyle/>
           <a:p>
-            <a:pPr marL="0" indent="0" algn="r">
-              <a:buNone/>
-            </a:pPr>
+            <a:pPr lvl="1"/>
             <a:r>
-              <a:rPr lang="en-US" sz="2400" kern="1200">
-                <a:solidFill>
-                  <a:schemeClr val="tx1"/>
-                </a:solidFill>
-                <a:latin typeface="+mn-lt"/>
-                <a:ea typeface="+mn-ea"/>
-                <a:cs typeface="+mn-cs"/>
-              </a:rPr>
-              <a:t>Tabark Kambal</a:t>
+              <a:rPr lang="en-US" err="1"/>
+              <a:t>Tabark</a:t>
             </a:r>
+            <a:r>
+              <a:rPr lang="en-US"/>
+              <a:t> </a:t>
+            </a:r>
+            <a:r>
+              <a:rPr lang="en-US" err="1"/>
+              <a:t>Kambal</a:t>
+            </a:r>
+            <a:endParaRPr lang="en-US"/>
+          </a:p>
+          <a:p>
+            <a:pPr lvl="2"/>
+            <a:r>
+              <a:rPr lang="en-US"/>
+              <a:t>Married for 3 years</a:t>
+            </a:r>
+          </a:p>
+          <a:p>
+            <a:pPr lvl="2"/>
+            <a:r>
+              <a:rPr lang="en-US"/>
+              <a:t>Two Children – two boys and one one the way; ages 2.5-1 years old.</a:t>
+            </a:r>
+          </a:p>
+          <a:p>
+            <a:pPr lvl="2"/>
+            <a:r>
+              <a:rPr lang="en-US"/>
+              <a:t>Going for first degree with Bellevue University</a:t>
+            </a:r>
+          </a:p>
+          <a:p>
+            <a:pPr lvl="2"/>
+            <a:r>
+              <a:rPr lang="en-US"/>
+              <a:t>AGR National Guard Supply NCO</a:t>
+            </a:r>
+          </a:p>
+          <a:p>
+            <a:pPr lvl="3"/>
+            <a:r>
+              <a:rPr lang="en-US"/>
+              <a:t>Currently working at Camp Ashland Regional Training Site(RTI)</a:t>
+            </a:r>
+          </a:p>
+          <a:p>
+            <a:pPr lvl="3"/>
+            <a:r>
+              <a:rPr lang="en-US"/>
+              <a:t>Providing logistic support for the RTI</a:t>
+            </a:r>
+          </a:p>
+          <a:p>
+            <a:pPr lvl="3"/>
+            <a:endParaRPr lang="en-US"/>
           </a:p>
         </p:txBody>
       </p:sp>
     </p:spTree>
     <p:extLst>
       <p:ext uri="{BB962C8B-B14F-4D97-AF65-F5344CB8AC3E}">
-        <p14:creationId xmlns:p14="http://schemas.microsoft.com/office/powerpoint/2010/main" val="822378075"/>
+        <p14:creationId xmlns:p14="http://schemas.microsoft.com/office/powerpoint/2010/main" val="973156046"/>
       </p:ext>
     </p:extLst>
   </p:cSld>
   <p:clrMapOvr>
     <a:masterClrMapping/>
   </p:clrMapOvr>
-  <p:timing>
-    <p:tnLst>
-      <p:par>
-        <p:cTn id="1" dur="indefinite" restart="never" nodeType="tmRoot">
-          <p:childTnLst>
-            <p:seq concurrent="1" nextAc="seek">
-              <p:cTn id="2" dur="indefinite" nodeType="mainSeq">
-                <p:childTnLst>
-                  <p:par>
-                    <p:cTn id="3" fill="hold">
-                      <p:stCondLst>
-                        <p:cond delay="indefinite"/>
-                        <p:cond evt="onBegin" delay="0">
-                          <p:tn val="2"/>
-                        </p:cond>
-                      </p:stCondLst>
-                      <p:childTnLst>
-                        <p:par>
-                          <p:cTn id="4" fill="hold">
-                            <p:stCondLst>
-                              <p:cond delay="0"/>
-                            </p:stCondLst>
-                            <p:childTnLst>
-                              <p:par>
-                                <p:cTn id="5" presetID="10" presetClass="entr" presetSubtype="0" fill="hold" grpId="0" nodeType="withEffect">
-                                  <p:stCondLst>
-                                    <p:cond delay="500"/>
-                                  </p:stCondLst>
-                                  <p:iterate type="wd">
-                                    <p:tmPct val="15000"/>
-                                  </p:iterate>
-                                  <p:childTnLst>
-                                    <p:set>
-                                      <p:cBhvr>
-                                        <p:cTn id="6" dur="1" fill="hold">
-                                          <p:stCondLst>
-                                            <p:cond delay="0"/>
-                                          </p:stCondLst>
-                                        </p:cTn>
-                                        <p:tgtEl>
-                                          <p:spTgt spid="2"/>
-                                        </p:tgtEl>
-                                        <p:attrNameLst>
-                                          <p:attrName>style.visibility</p:attrName>
-                                        </p:attrNameLst>
-                                      </p:cBhvr>
-                                      <p:to>
-                                        <p:strVal val="visible"/>
-                                      </p:to>
-                                    </p:set>
-                                    <p:animEffect transition="in" filter="fade">
-                                      <p:cBhvr>
-                                        <p:cTn id="7" dur="1000"/>
-                                        <p:tgtEl>
-                                          <p:spTgt spid="2"/>
-                                        </p:tgtEl>
-                                      </p:cBhvr>
-                                    </p:animEffect>
-                                  </p:childTnLst>
-                                </p:cTn>
-                              </p:par>
-                            </p:childTnLst>
-                          </p:cTn>
-                        </p:par>
-                      </p:childTnLst>
-                    </p:cTn>
-                  </p:par>
-                </p:childTnLst>
-              </p:cTn>
-              <p:prevCondLst>
-                <p:cond evt="onPrev" delay="0">
-                  <p:tgtEl>
-                    <p:sldTgt/>
-                  </p:tgtEl>
-                </p:cond>
-              </p:prevCondLst>
-              <p:nextCondLst>
-                <p:cond evt="onNext" delay="0">
-                  <p:tgtEl>
-                    <p:sldTgt/>
-                  </p:tgtEl>
-                </p:cond>
-              </p:nextCondLst>
-            </p:seq>
-          </p:childTnLst>
-        </p:cTn>
-      </p:par>
-    </p:tnLst>
-    <p:bldLst>
-      <p:bldP spid="2" grpId="0"/>
-    </p:bldLst>
-  </p:timing>
 </p:sld>
 </file>
 

</xml_diff>